<commit_message>
Pequena Mudança na Plataforma de Utilização
Declaração da plataforma WEB
</commit_message>
<xml_diff>
--- a/Editables/Fase 1 - Apresentação.pptx
+++ b/Editables/Fase 1 - Apresentação.pptx
@@ -761,6 +761,53 @@
       </pc:sldChg>
     </pc:docChg>
   </pc:docChgLst>
+  <pc:docChgLst>
+    <pc:chgData name="Tiago Fonseca" userId="0bf00240-3020-4d01-a24b-06825a2f49d7" providerId="ADAL" clId="{3560B347-D4E4-4F91-A83E-BCFB5DC5A660}"/>
+    <pc:docChg chg="modSld">
+      <pc:chgData name="Tiago Fonseca" userId="0bf00240-3020-4d01-a24b-06825a2f49d7" providerId="ADAL" clId="{3560B347-D4E4-4F91-A83E-BCFB5DC5A660}" dt="2023-04-13T10:21:52.360" v="43" actId="20577"/>
+      <pc:docMkLst>
+        <pc:docMk/>
+      </pc:docMkLst>
+      <pc:sldChg chg="modSp mod">
+        <pc:chgData name="Tiago Fonseca" userId="0bf00240-3020-4d01-a24b-06825a2f49d7" providerId="ADAL" clId="{3560B347-D4E4-4F91-A83E-BCFB5DC5A660}" dt="2023-04-13T10:21:52.360" v="43" actId="20577"/>
+        <pc:sldMkLst>
+          <pc:docMk/>
+          <pc:sldMk cId="2113348865" sldId="271"/>
+        </pc:sldMkLst>
+        <pc:spChg chg="mod">
+          <ac:chgData name="Tiago Fonseca" userId="0bf00240-3020-4d01-a24b-06825a2f49d7" providerId="ADAL" clId="{3560B347-D4E4-4F91-A83E-BCFB5DC5A660}" dt="2023-04-13T10:21:52.360" v="43" actId="20577"/>
+          <ac:spMkLst>
+            <pc:docMk/>
+            <pc:sldMk cId="2113348865" sldId="271"/>
+            <ac:spMk id="3" creationId="{E82AFDAC-88B1-3AB9-A268-4DF9CBD41DFE}"/>
+          </ac:spMkLst>
+        </pc:spChg>
+      </pc:sldChg>
+      <pc:sldChg chg="modSp mod">
+        <pc:chgData name="Tiago Fonseca" userId="0bf00240-3020-4d01-a24b-06825a2f49d7" providerId="ADAL" clId="{3560B347-D4E4-4F91-A83E-BCFB5DC5A660}" dt="2023-04-13T08:03:28.687" v="37" actId="20577"/>
+        <pc:sldMkLst>
+          <pc:docMk/>
+          <pc:sldMk cId="1489756019" sldId="277"/>
+        </pc:sldMkLst>
+        <pc:spChg chg="mod">
+          <ac:chgData name="Tiago Fonseca" userId="0bf00240-3020-4d01-a24b-06825a2f49d7" providerId="ADAL" clId="{3560B347-D4E4-4F91-A83E-BCFB5DC5A660}" dt="2023-04-13T08:03:15.575" v="8" actId="20577"/>
+          <ac:spMkLst>
+            <pc:docMk/>
+            <pc:sldMk cId="1489756019" sldId="277"/>
+            <ac:spMk id="4" creationId="{2721AF49-4A4E-A592-68FA-93F3A1029D40}"/>
+          </ac:spMkLst>
+        </pc:spChg>
+        <pc:spChg chg="mod">
+          <ac:chgData name="Tiago Fonseca" userId="0bf00240-3020-4d01-a24b-06825a2f49d7" providerId="ADAL" clId="{3560B347-D4E4-4F91-A83E-BCFB5DC5A660}" dt="2023-04-13T08:03:28.687" v="37" actId="20577"/>
+          <ac:spMkLst>
+            <pc:docMk/>
+            <pc:sldMk cId="1489756019" sldId="277"/>
+            <ac:spMk id="6" creationId="{E35D8F96-B8AD-CDB0-20C5-3C57BE40BF8F}"/>
+          </ac:spMkLst>
+        </pc:spChg>
+      </pc:sldChg>
+    </pc:docChg>
+  </pc:docChgLst>
 </pc:chgInfo>
 </file>
 
@@ -858,7 +905,7 @@
           <a:p>
             <a:fld id="{D2D36A62-A875-4277-8A16-493F38412961}" type="datetime1">
               <a:rPr lang="pt-PT" smtClean="0"/>
-              <a:t>12/04/2023</a:t>
+              <a:t>13/04/2023</a:t>
             </a:fld>
             <a:endParaRPr lang="pt-PT" dirty="0"/>
           </a:p>
@@ -1036,7 +1083,7 @@
             <a:fld id="{972DF3F9-B67B-4F27-BE75-227E70802F2F}" type="datetime1">
               <a:rPr lang="pt-PT" smtClean="0"/>
               <a:pPr/>
-              <a:t>12/04/2023</a:t>
+              <a:t>13/04/2023</a:t>
             </a:fld>
             <a:endParaRPr lang="pt-PT" dirty="0"/>
           </a:p>
@@ -1863,7 +1910,7 @@
             <a:pPr rtl="0"/>
             <a:fld id="{C8F587F8-FA17-455A-8A00-703CCEE25921}" type="datetime1">
               <a:rPr lang="pt-PT" noProof="0" smtClean="0"/>
-              <a:t>12/04/2023</a:t>
+              <a:t>13/04/2023</a:t>
             </a:fld>
             <a:endParaRPr lang="pt-PT" noProof="0"/>
           </a:p>
@@ -2076,7 +2123,7 @@
             <a:pPr rtl="0"/>
             <a:fld id="{0DD3EE91-6B45-4017-AD42-B2329289C442}" type="datetime1">
               <a:rPr lang="pt-PT" noProof="0" smtClean="0"/>
-              <a:t>12/04/2023</a:t>
+              <a:t>13/04/2023</a:t>
             </a:fld>
             <a:endParaRPr lang="pt-PT" noProof="0"/>
           </a:p>
@@ -2293,7 +2340,7 @@
             <a:pPr rtl="0"/>
             <a:fld id="{86E0D85C-D33A-4C75-B1F4-90B4B43E0A2E}" type="datetime1">
               <a:rPr lang="pt-PT" noProof="0" smtClean="0"/>
-              <a:t>12/04/2023</a:t>
+              <a:t>13/04/2023</a:t>
             </a:fld>
             <a:endParaRPr lang="pt-PT" noProof="0"/>
           </a:p>
@@ -2496,7 +2543,7 @@
             <a:pPr rtl="0"/>
             <a:fld id="{69E31215-3AA2-4E07-BD89-8366B4EADC19}" type="datetime1">
               <a:rPr lang="pt-PT" noProof="0" smtClean="0"/>
-              <a:t>12/04/2023</a:t>
+              <a:t>13/04/2023</a:t>
             </a:fld>
             <a:endParaRPr lang="pt-PT" noProof="0"/>
           </a:p>
@@ -2778,7 +2825,7 @@
             <a:pPr rtl="0"/>
             <a:fld id="{ECA80334-0323-4E20-AD7A-8ACCF6B591D0}" type="datetime1">
               <a:rPr lang="pt-PT" noProof="0" smtClean="0"/>
-              <a:t>12/04/2023</a:t>
+              <a:t>13/04/2023</a:t>
             </a:fld>
             <a:endParaRPr lang="pt-PT" noProof="0"/>
           </a:p>
@@ -3047,7 +3094,7 @@
             <a:pPr rtl="0"/>
             <a:fld id="{80F38C40-5F7E-4311-AF5A-B29D2C969CD2}" type="datetime1">
               <a:rPr lang="pt-PT" noProof="0" smtClean="0"/>
-              <a:t>12/04/2023</a:t>
+              <a:t>13/04/2023</a:t>
             </a:fld>
             <a:endParaRPr lang="pt-PT" noProof="0"/>
           </a:p>
@@ -3464,7 +3511,7 @@
             <a:pPr rtl="0"/>
             <a:fld id="{C325681A-4BE1-41EB-B484-891CF1CBCA06}" type="datetime1">
               <a:rPr lang="pt-PT" noProof="0" smtClean="0"/>
-              <a:t>12/04/2023</a:t>
+              <a:t>13/04/2023</a:t>
             </a:fld>
             <a:endParaRPr lang="pt-PT" noProof="0"/>
           </a:p>
@@ -3616,7 +3663,7 @@
             <a:pPr rtl="0"/>
             <a:fld id="{3D25063B-819E-492C-A7C2-E1829FA159C4}" type="datetime1">
               <a:rPr lang="pt-PT" noProof="0" smtClean="0"/>
-              <a:t>12/04/2023</a:t>
+              <a:t>13/04/2023</a:t>
             </a:fld>
             <a:endParaRPr lang="pt-PT" noProof="0"/>
           </a:p>
@@ -3745,7 +3792,7 @@
             <a:pPr rtl="0"/>
             <a:fld id="{38C1FFB3-F6B6-4411-A5F4-B2FC50F77E82}" type="datetime1">
               <a:rPr lang="pt-PT" noProof="0" smtClean="0"/>
-              <a:t>12/04/2023</a:t>
+              <a:t>13/04/2023</a:t>
             </a:fld>
             <a:endParaRPr lang="pt-PT" noProof="0"/>
           </a:p>
@@ -3998,7 +4045,7 @@
             <a:pPr rtl="0"/>
             <a:fld id="{F2757A85-4FE8-47BC-A31A-F7326AAD7004}" type="datetime1">
               <a:rPr lang="pt-PT" noProof="0" smtClean="0"/>
-              <a:t>12/04/2023</a:t>
+              <a:t>13/04/2023</a:t>
             </a:fld>
             <a:endParaRPr lang="pt-PT" noProof="0"/>
           </a:p>
@@ -4446,7 +4493,7 @@
             <a:pPr rtl="0"/>
             <a:fld id="{F08BED7F-40FB-4334-A984-6AEE9A357FE3}" type="datetime1">
               <a:rPr lang="pt-PT" noProof="0" smtClean="0"/>
-              <a:t>12/04/2023</a:t>
+              <a:t>13/04/2023</a:t>
             </a:fld>
             <a:endParaRPr lang="pt-PT" noProof="0"/>
           </a:p>
@@ -4775,7 +4822,7 @@
             <a:pPr rtl="0"/>
             <a:fld id="{65E81E91-8178-42DA-ACD7-17B3FDA5134B}" type="datetime1">
               <a:rPr lang="pt-PT" noProof="0" smtClean="0"/>
-              <a:t>12/04/2023</a:t>
+              <a:t>13/04/2023</a:t>
             </a:fld>
             <a:endParaRPr lang="pt-PT" noProof="0"/>
           </a:p>
@@ -5683,7 +5730,7 @@
             </a:pPr>
             <a:r>
               <a:rPr lang="pt-PT" dirty="0"/>
-              <a:t>Plataforma que disponibiliza, de forma gratuita, conselhos financeiros e serviços complementares aos bancos, facilitado ainda o acesso a créditos</a:t>
+              <a:t>Plataforma que disponibiliza, de forma gratuita, conselhos financeiros e serviços complementares aos bancos, facilitando o acesso a créditos</a:t>
             </a:r>
           </a:p>
         </p:txBody>
@@ -5739,8 +5786,13 @@
           <a:p>
             <a:r>
               <a:rPr lang="pt-PT" dirty="0"/>
-              <a:t>Serviços Complementares, tais como operações de débito e análise do mesmo</a:t>
-            </a:r>
+              <a:t>Serviços Complementares, tais como operações de débito e análise </a:t>
+            </a:r>
+            <a:r>
+              <a:rPr lang="pt-PT"/>
+              <a:t>de débito</a:t>
+            </a:r>
+            <a:endParaRPr lang="pt-PT" dirty="0"/>
           </a:p>
           <a:p>
             <a:r>
@@ -7440,13 +7492,13 @@
           <a:p>
             <a:r>
               <a:rPr lang="pt-PT" dirty="0"/>
+              <a:t>Mediação de Créditos</a:t>
+            </a:r>
+          </a:p>
+          <a:p>
+            <a:r>
+              <a:rPr lang="pt-PT" dirty="0"/>
               <a:t>Serviços Complementares ao Sistema Bancário</a:t>
-            </a:r>
-          </a:p>
-          <a:p>
-            <a:r>
-              <a:rPr lang="pt-PT" dirty="0"/>
-              <a:t>Mediação de Crédito</a:t>
             </a:r>
           </a:p>
           <a:p>
@@ -10774,9 +10826,16 @@
 <file path=customXml/itemProps3.xml><?xml version="1.0" encoding="utf-8"?>
 <ds:datastoreItem xmlns:ds="http://schemas.openxmlformats.org/officeDocument/2006/customXml" ds:itemID="{0DAABB37-1599-4AE8-818C-82E84CA93DF4}">
   <ds:schemaRefs>
+    <ds:schemaRef ds:uri="http://purl.org/dc/elements/1.1/"/>
+    <ds:schemaRef ds:uri="http://schemas.microsoft.com/office/infopath/2007/PartnerControls"/>
+    <ds:schemaRef ds:uri="http://purl.org/dc/dcmitype/"/>
+    <ds:schemaRef ds:uri="71af3243-3dd4-4a8d-8c0d-dd76da1f02a5"/>
+    <ds:schemaRef ds:uri="16c05727-aa75-4e4a-9b5f-8a80a1165891"/>
+    <ds:schemaRef ds:uri="http://purl.org/dc/terms/"/>
+    <ds:schemaRef ds:uri="http://schemas.microsoft.com/office/2006/documentManagement/types"/>
+    <ds:schemaRef ds:uri="http://schemas.openxmlformats.org/package/2006/metadata/core-properties"/>
     <ds:schemaRef ds:uri="http://schemas.microsoft.com/office/2006/metadata/properties"/>
-    <ds:schemaRef ds:uri="http://schemas.microsoft.com/office/infopath/2007/PartnerControls"/>
-    <ds:schemaRef ds:uri="71af3243-3dd4-4a8d-8c0d-dd76da1f02a5"/>
+    <ds:schemaRef ds:uri="http://www.w3.org/XML/1998/namespace"/>
   </ds:schemaRefs>
 </ds:datastoreItem>
 </file>
</xml_diff>